<commit_message>
update ppt and handout
</commit_message>
<xml_diff>
--- a/Presentation Lambda Function 4.pptx
+++ b/Presentation Lambda Function 4.pptx
@@ -5,7 +5,7 @@
     <p:sldMasterId id="2147483648" r:id="rId1"/>
   </p:sldMasterIdLst>
   <p:notesMasterIdLst>
-    <p:notesMasterId r:id="rId14"/>
+    <p:notesMasterId r:id="rId11"/>
   </p:notesMasterIdLst>
   <p:sldIdLst>
     <p:sldId id="256" r:id="rId2"/>
@@ -16,10 +16,7 @@
     <p:sldId id="274" r:id="rId7"/>
     <p:sldId id="276" r:id="rId8"/>
     <p:sldId id="287" r:id="rId9"/>
-    <p:sldId id="294" r:id="rId10"/>
-    <p:sldId id="296" r:id="rId11"/>
-    <p:sldId id="297" r:id="rId12"/>
-    <p:sldId id="272" r:id="rId13"/>
+    <p:sldId id="289" r:id="rId10"/>
   </p:sldIdLst>
   <p:sldSz cx="12192000" cy="6858000"/>
   <p:notesSz cx="6858000" cy="9144000"/>
@@ -292,7 +289,7 @@
           <a:p>
             <a:fld id="{7AE0ADB2-2486-4E17-85FC-592DC8A173E4}" type="datetimeFigureOut">
               <a:rPr lang="zh-CN" altLang="en-US" smtClean="0"/>
-              <a:t>2024/11/10</a:t>
+              <a:t>2024/11/11</a:t>
             </a:fld>
             <a:endParaRPr lang="zh-CN" altLang="en-US"/>
           </a:p>
@@ -792,7 +789,7 @@
           <a:p>
             <a:fld id="{B12B227D-24D3-BE47-B66A-9B7488BD818D}" type="datetimeFigureOut">
               <a:rPr lang="en-CN" smtClean="0"/>
-              <a:t>11/10/2024</a:t>
+              <a:t>11/11/2024</a:t>
             </a:fld>
             <a:endParaRPr lang="en-CN"/>
           </a:p>
@@ -992,7 +989,7 @@
           <a:p>
             <a:fld id="{B12B227D-24D3-BE47-B66A-9B7488BD818D}" type="datetimeFigureOut">
               <a:rPr lang="en-CN" smtClean="0"/>
-              <a:t>11/10/2024</a:t>
+              <a:t>11/11/2024</a:t>
             </a:fld>
             <a:endParaRPr lang="en-CN"/>
           </a:p>
@@ -1202,7 +1199,7 @@
           <a:p>
             <a:fld id="{B12B227D-24D3-BE47-B66A-9B7488BD818D}" type="datetimeFigureOut">
               <a:rPr lang="en-CN" smtClean="0"/>
-              <a:t>11/10/2024</a:t>
+              <a:t>11/11/2024</a:t>
             </a:fld>
             <a:endParaRPr lang="en-CN"/>
           </a:p>
@@ -1402,7 +1399,7 @@
           <a:p>
             <a:fld id="{B12B227D-24D3-BE47-B66A-9B7488BD818D}" type="datetimeFigureOut">
               <a:rPr lang="en-CN" smtClean="0"/>
-              <a:t>11/10/2024</a:t>
+              <a:t>11/11/2024</a:t>
             </a:fld>
             <a:endParaRPr lang="en-CN"/>
           </a:p>
@@ -1678,7 +1675,7 @@
           <a:p>
             <a:fld id="{B12B227D-24D3-BE47-B66A-9B7488BD818D}" type="datetimeFigureOut">
               <a:rPr lang="en-CN" smtClean="0"/>
-              <a:t>11/10/2024</a:t>
+              <a:t>11/11/2024</a:t>
             </a:fld>
             <a:endParaRPr lang="en-CN"/>
           </a:p>
@@ -1946,7 +1943,7 @@
           <a:p>
             <a:fld id="{B12B227D-24D3-BE47-B66A-9B7488BD818D}" type="datetimeFigureOut">
               <a:rPr lang="en-CN" smtClean="0"/>
-              <a:t>11/10/2024</a:t>
+              <a:t>11/11/2024</a:t>
             </a:fld>
             <a:endParaRPr lang="en-CN"/>
           </a:p>
@@ -2361,7 +2358,7 @@
           <a:p>
             <a:fld id="{B12B227D-24D3-BE47-B66A-9B7488BD818D}" type="datetimeFigureOut">
               <a:rPr lang="en-CN" smtClean="0"/>
-              <a:t>11/10/2024</a:t>
+              <a:t>11/11/2024</a:t>
             </a:fld>
             <a:endParaRPr lang="en-CN"/>
           </a:p>
@@ -2503,7 +2500,7 @@
           <a:p>
             <a:fld id="{B12B227D-24D3-BE47-B66A-9B7488BD818D}" type="datetimeFigureOut">
               <a:rPr lang="en-CN" smtClean="0"/>
-              <a:t>11/10/2024</a:t>
+              <a:t>11/11/2024</a:t>
             </a:fld>
             <a:endParaRPr lang="en-CN"/>
           </a:p>
@@ -2616,7 +2613,7 @@
           <a:p>
             <a:fld id="{B12B227D-24D3-BE47-B66A-9B7488BD818D}" type="datetimeFigureOut">
               <a:rPr lang="en-CN" smtClean="0"/>
-              <a:t>11/10/2024</a:t>
+              <a:t>11/11/2024</a:t>
             </a:fld>
             <a:endParaRPr lang="en-CN"/>
           </a:p>
@@ -2929,7 +2926,7 @@
           <a:p>
             <a:fld id="{B12B227D-24D3-BE47-B66A-9B7488BD818D}" type="datetimeFigureOut">
               <a:rPr lang="en-CN" smtClean="0"/>
-              <a:t>11/10/2024</a:t>
+              <a:t>11/11/2024</a:t>
             </a:fld>
             <a:endParaRPr lang="en-CN"/>
           </a:p>
@@ -3218,7 +3215,7 @@
           <a:p>
             <a:fld id="{B12B227D-24D3-BE47-B66A-9B7488BD818D}" type="datetimeFigureOut">
               <a:rPr lang="en-CN" smtClean="0"/>
-              <a:t>11/10/2024</a:t>
+              <a:t>11/11/2024</a:t>
             </a:fld>
             <a:endParaRPr lang="en-CN"/>
           </a:p>
@@ -3461,7 +3458,7 @@
           <a:p>
             <a:fld id="{B12B227D-24D3-BE47-B66A-9B7488BD818D}" type="datetimeFigureOut">
               <a:rPr lang="en-CN" smtClean="0"/>
-              <a:t>11/10/2024</a:t>
+              <a:t>11/11/2024</a:t>
             </a:fld>
             <a:endParaRPr lang="en-CN"/>
           </a:p>
@@ -3957,24 +3954,20 @@
           <a:p>
             <a:r>
               <a:rPr lang="en-US" altLang="zh-CN" dirty="0">
+                <a:solidFill>
+                  <a:srgbClr val="FFC000"/>
+                </a:solidFill>
                 <a:latin typeface="Arial" panose="020B0604020202020204" pitchFamily="34" charset="0"/>
                 <a:cs typeface="Arial" panose="020B0604020202020204" pitchFamily="34" charset="0"/>
               </a:rPr>
-              <a:t>Presenter: Yilin Pan, </a:t>
-            </a:r>
-            <a:r>
-              <a:rPr lang="en-US" altLang="zh-CN" dirty="0" err="1">
-                <a:latin typeface="Arial" panose="020B0604020202020204" pitchFamily="34" charset="0"/>
-                <a:cs typeface="Arial" panose="020B0604020202020204" pitchFamily="34" charset="0"/>
-              </a:rPr>
-              <a:t>Xiaojing</a:t>
+              <a:t>Anonymous</a:t>
             </a:r>
             <a:r>
               <a:rPr lang="en-US" altLang="zh-CN" dirty="0">
                 <a:latin typeface="Arial" panose="020B0604020202020204" pitchFamily="34" charset="0"/>
                 <a:cs typeface="Arial" panose="020B0604020202020204" pitchFamily="34" charset="0"/>
               </a:rPr>
-              <a:t> An, Weihang Ding</a:t>
+              <a:t> Presenters</a:t>
             </a:r>
             <a:endParaRPr lang="en-CN" dirty="0">
               <a:latin typeface="Arial" panose="020B0604020202020204" pitchFamily="34" charset="0"/>
@@ -3987,558 +3980,6 @@
     <p:extLst>
       <p:ext uri="{BB962C8B-B14F-4D97-AF65-F5344CB8AC3E}">
         <p14:creationId xmlns:p14="http://schemas.microsoft.com/office/powerpoint/2010/main" val="1761610305"/>
-      </p:ext>
-    </p:extLst>
-  </p:cSld>
-  <p:clrMapOvr>
-    <a:masterClrMapping/>
-  </p:clrMapOvr>
-</p:sld>
-</file>
-
-<file path=ppt/slides/slide10.xml><?xml version="1.0" encoding="utf-8"?>
-<p:sld xmlns:a="http://schemas.openxmlformats.org/drawingml/2006/main" xmlns:r="http://schemas.openxmlformats.org/officeDocument/2006/relationships" xmlns:p="http://schemas.openxmlformats.org/presentationml/2006/main">
-  <p:cSld>
-    <p:spTree>
-      <p:nvGrpSpPr>
-        <p:cNvPr id="1" name="">
-          <a:extLst>
-            <a:ext uri="{FF2B5EF4-FFF2-40B4-BE49-F238E27FC236}">
-              <a16:creationId xmlns:a16="http://schemas.microsoft.com/office/drawing/2014/main" id="{E94C550B-EE09-40E6-7C5B-0E96ED40252A}"/>
-            </a:ext>
-          </a:extLst>
-        </p:cNvPr>
-        <p:cNvGrpSpPr/>
-        <p:nvPr/>
-      </p:nvGrpSpPr>
-      <p:grpSpPr>
-        <a:xfrm>
-          <a:off x="0" y="0"/>
-          <a:ext cx="0" cy="0"/>
-          <a:chOff x="0" y="0"/>
-          <a:chExt cx="0" cy="0"/>
-        </a:xfrm>
-      </p:grpSpPr>
-      <p:sp>
-        <p:nvSpPr>
-          <p:cNvPr id="2" name="Title 1">
-            <a:extLst>
-              <a:ext uri="{FF2B5EF4-FFF2-40B4-BE49-F238E27FC236}">
-                <a16:creationId xmlns:a16="http://schemas.microsoft.com/office/drawing/2014/main" id="{5B9E30AB-16B8-ACFB-0F39-7E95A82CB57B}"/>
-              </a:ext>
-            </a:extLst>
-          </p:cNvPr>
-          <p:cNvSpPr>
-            <a:spLocks noGrp="1"/>
-          </p:cNvSpPr>
-          <p:nvPr>
-            <p:ph type="title"/>
-          </p:nvPr>
-        </p:nvSpPr>
-        <p:spPr/>
-        <p:txBody>
-          <a:bodyPr/>
-          <a:lstStyle/>
-          <a:p>
-            <a:r>
-              <a:rPr lang="en-US" altLang="zh-CN" dirty="0"/>
-              <a:t>The </a:t>
-            </a:r>
-            <a:r>
-              <a:rPr lang="en-US" altLang="zh-CN" dirty="0">
-                <a:solidFill>
-                  <a:srgbClr val="0070C0"/>
-                </a:solidFill>
-              </a:rPr>
-              <a:t>advantage</a:t>
-            </a:r>
-            <a:r>
-              <a:rPr lang="en-US" altLang="zh-CN" dirty="0"/>
-              <a:t> of using Lambda function</a:t>
-            </a:r>
-            <a:endParaRPr lang="en-CN" dirty="0"/>
-          </a:p>
-        </p:txBody>
-      </p:sp>
-      <p:sp>
-        <p:nvSpPr>
-          <p:cNvPr id="8" name="Content Placeholder 2">
-            <a:extLst>
-              <a:ext uri="{FF2B5EF4-FFF2-40B4-BE49-F238E27FC236}">
-                <a16:creationId xmlns:a16="http://schemas.microsoft.com/office/drawing/2014/main" id="{D1DE2D26-F308-22AA-7396-3A5A2F5FCE69}"/>
-              </a:ext>
-            </a:extLst>
-          </p:cNvPr>
-          <p:cNvSpPr txBox="1">
-            <a:spLocks/>
-          </p:cNvSpPr>
-          <p:nvPr/>
-        </p:nvSpPr>
-        <p:spPr>
-          <a:xfrm>
-            <a:off x="838200" y="1970848"/>
-            <a:ext cx="6170653" cy="2464457"/>
-          </a:xfrm>
-          <a:prstGeom prst="rect">
-            <a:avLst/>
-          </a:prstGeom>
-        </p:spPr>
-        <p:txBody>
-          <a:bodyPr vert="horz" lIns="91440" tIns="45720" rIns="91440" bIns="45720" rtlCol="0">
-            <a:normAutofit fontScale="92500" lnSpcReduction="10000"/>
-          </a:bodyPr>
-          <a:lstStyle>
-            <a:lvl1pPr marL="228600" indent="-228600" algn="l" defTabSz="914400" rtl="0" eaLnBrk="1" latinLnBrk="0" hangingPunct="1">
-              <a:lnSpc>
-                <a:spcPct val="90000"/>
-              </a:lnSpc>
-              <a:spcBef>
-                <a:spcPts val="1000"/>
-              </a:spcBef>
-              <a:buFont typeface="Arial" panose="020B0604020202020204" pitchFamily="34" charset="0"/>
-              <a:buChar char="•"/>
-              <a:defRPr sz="2800" kern="1200">
-                <a:solidFill>
-                  <a:schemeClr val="tx1"/>
-                </a:solidFill>
-                <a:latin typeface="+mn-lt"/>
-                <a:ea typeface="+mn-ea"/>
-                <a:cs typeface="+mn-cs"/>
-              </a:defRPr>
-            </a:lvl1pPr>
-            <a:lvl2pPr marL="685800" indent="-228600" algn="l" defTabSz="914400" rtl="0" eaLnBrk="1" latinLnBrk="0" hangingPunct="1">
-              <a:lnSpc>
-                <a:spcPct val="90000"/>
-              </a:lnSpc>
-              <a:spcBef>
-                <a:spcPts val="500"/>
-              </a:spcBef>
-              <a:buFont typeface="Arial" panose="020B0604020202020204" pitchFamily="34" charset="0"/>
-              <a:buChar char="•"/>
-              <a:defRPr sz="2400" kern="1200">
-                <a:solidFill>
-                  <a:schemeClr val="tx1"/>
-                </a:solidFill>
-                <a:latin typeface="+mn-lt"/>
-                <a:ea typeface="+mn-ea"/>
-                <a:cs typeface="+mn-cs"/>
-              </a:defRPr>
-            </a:lvl2pPr>
-            <a:lvl3pPr marL="1143000" indent="-228600" algn="l" defTabSz="914400" rtl="0" eaLnBrk="1" latinLnBrk="0" hangingPunct="1">
-              <a:lnSpc>
-                <a:spcPct val="90000"/>
-              </a:lnSpc>
-              <a:spcBef>
-                <a:spcPts val="500"/>
-              </a:spcBef>
-              <a:buFont typeface="Arial" panose="020B0604020202020204" pitchFamily="34" charset="0"/>
-              <a:buChar char="•"/>
-              <a:defRPr sz="2000" kern="1200">
-                <a:solidFill>
-                  <a:schemeClr val="tx1"/>
-                </a:solidFill>
-                <a:latin typeface="+mn-lt"/>
-                <a:ea typeface="+mn-ea"/>
-                <a:cs typeface="+mn-cs"/>
-              </a:defRPr>
-            </a:lvl3pPr>
-            <a:lvl4pPr marL="1600200" indent="-228600" algn="l" defTabSz="914400" rtl="0" eaLnBrk="1" latinLnBrk="0" hangingPunct="1">
-              <a:lnSpc>
-                <a:spcPct val="90000"/>
-              </a:lnSpc>
-              <a:spcBef>
-                <a:spcPts val="500"/>
-              </a:spcBef>
-              <a:buFont typeface="Arial" panose="020B0604020202020204" pitchFamily="34" charset="0"/>
-              <a:buChar char="•"/>
-              <a:defRPr sz="1800" kern="1200">
-                <a:solidFill>
-                  <a:schemeClr val="tx1"/>
-                </a:solidFill>
-                <a:latin typeface="+mn-lt"/>
-                <a:ea typeface="+mn-ea"/>
-                <a:cs typeface="+mn-cs"/>
-              </a:defRPr>
-            </a:lvl4pPr>
-            <a:lvl5pPr marL="2057400" indent="-228600" algn="l" defTabSz="914400" rtl="0" eaLnBrk="1" latinLnBrk="0" hangingPunct="1">
-              <a:lnSpc>
-                <a:spcPct val="90000"/>
-              </a:lnSpc>
-              <a:spcBef>
-                <a:spcPts val="500"/>
-              </a:spcBef>
-              <a:buFont typeface="Arial" panose="020B0604020202020204" pitchFamily="34" charset="0"/>
-              <a:buChar char="•"/>
-              <a:defRPr sz="1800" kern="1200">
-                <a:solidFill>
-                  <a:schemeClr val="tx1"/>
-                </a:solidFill>
-                <a:latin typeface="+mn-lt"/>
-                <a:ea typeface="+mn-ea"/>
-                <a:cs typeface="+mn-cs"/>
-              </a:defRPr>
-            </a:lvl5pPr>
-            <a:lvl6pPr marL="2514600" indent="-228600" algn="l" defTabSz="914400" rtl="0" eaLnBrk="1" latinLnBrk="0" hangingPunct="1">
-              <a:lnSpc>
-                <a:spcPct val="90000"/>
-              </a:lnSpc>
-              <a:spcBef>
-                <a:spcPts val="500"/>
-              </a:spcBef>
-              <a:buFont typeface="Arial" panose="020B0604020202020204" pitchFamily="34" charset="0"/>
-              <a:buChar char="•"/>
-              <a:defRPr sz="1800" kern="1200">
-                <a:solidFill>
-                  <a:schemeClr val="tx1"/>
-                </a:solidFill>
-                <a:latin typeface="+mn-lt"/>
-                <a:ea typeface="+mn-ea"/>
-                <a:cs typeface="+mn-cs"/>
-              </a:defRPr>
-            </a:lvl6pPr>
-            <a:lvl7pPr marL="2971800" indent="-228600" algn="l" defTabSz="914400" rtl="0" eaLnBrk="1" latinLnBrk="0" hangingPunct="1">
-              <a:lnSpc>
-                <a:spcPct val="90000"/>
-              </a:lnSpc>
-              <a:spcBef>
-                <a:spcPts val="500"/>
-              </a:spcBef>
-              <a:buFont typeface="Arial" panose="020B0604020202020204" pitchFamily="34" charset="0"/>
-              <a:buChar char="•"/>
-              <a:defRPr sz="1800" kern="1200">
-                <a:solidFill>
-                  <a:schemeClr val="tx1"/>
-                </a:solidFill>
-                <a:latin typeface="+mn-lt"/>
-                <a:ea typeface="+mn-ea"/>
-                <a:cs typeface="+mn-cs"/>
-              </a:defRPr>
-            </a:lvl7pPr>
-            <a:lvl8pPr marL="3429000" indent="-228600" algn="l" defTabSz="914400" rtl="0" eaLnBrk="1" latinLnBrk="0" hangingPunct="1">
-              <a:lnSpc>
-                <a:spcPct val="90000"/>
-              </a:lnSpc>
-              <a:spcBef>
-                <a:spcPts val="500"/>
-              </a:spcBef>
-              <a:buFont typeface="Arial" panose="020B0604020202020204" pitchFamily="34" charset="0"/>
-              <a:buChar char="•"/>
-              <a:defRPr sz="1800" kern="1200">
-                <a:solidFill>
-                  <a:schemeClr val="tx1"/>
-                </a:solidFill>
-                <a:latin typeface="+mn-lt"/>
-                <a:ea typeface="+mn-ea"/>
-                <a:cs typeface="+mn-cs"/>
-              </a:defRPr>
-            </a:lvl8pPr>
-            <a:lvl9pPr marL="3886200" indent="-228600" algn="l" defTabSz="914400" rtl="0" eaLnBrk="1" latinLnBrk="0" hangingPunct="1">
-              <a:lnSpc>
-                <a:spcPct val="90000"/>
-              </a:lnSpc>
-              <a:spcBef>
-                <a:spcPts val="500"/>
-              </a:spcBef>
-              <a:buFont typeface="Arial" panose="020B0604020202020204" pitchFamily="34" charset="0"/>
-              <a:buChar char="•"/>
-              <a:defRPr sz="1800" kern="1200">
-                <a:solidFill>
-                  <a:schemeClr val="tx1"/>
-                </a:solidFill>
-                <a:latin typeface="+mn-lt"/>
-                <a:ea typeface="+mn-ea"/>
-                <a:cs typeface="+mn-cs"/>
-              </a:defRPr>
-            </a:lvl9pPr>
-          </a:lstStyle>
-          <a:p>
-            <a:pPr marL="0" indent="0">
-              <a:buFont typeface="Arial" panose="020B0604020202020204" pitchFamily="34" charset="0"/>
-              <a:buNone/>
-            </a:pPr>
-            <a:endParaRPr lang="en-CN" sz="3200" b="1" kern="0" spc="10" dirty="0">
-              <a:solidFill>
-                <a:srgbClr val="000000"/>
-              </a:solidFill>
-              <a:latin typeface="Aptos" panose="020B0004020202020204" pitchFamily="34" charset="0"/>
-              <a:ea typeface="Times New Roman" panose="02020603050405020304" pitchFamily="18" charset="0"/>
-              <a:cs typeface="Times New Roman" panose="02020603050405020304" pitchFamily="18" charset="0"/>
-            </a:endParaRPr>
-          </a:p>
-          <a:p>
-            <a:endParaRPr lang="en-CN" sz="3200" b="1" kern="0" spc="10" dirty="0">
-              <a:solidFill>
-                <a:srgbClr val="000000"/>
-              </a:solidFill>
-              <a:latin typeface="Aptos" panose="020B0004020202020204" pitchFamily="34" charset="0"/>
-              <a:ea typeface="Times New Roman" panose="02020603050405020304" pitchFamily="18" charset="0"/>
-              <a:cs typeface="Times New Roman" panose="02020603050405020304" pitchFamily="18" charset="0"/>
-            </a:endParaRPr>
-          </a:p>
-          <a:p>
-            <a:r>
-              <a:rPr lang="en-CN" sz="3200" b="1" kern="0" spc="10" dirty="0">
-                <a:latin typeface="Aptos" panose="020B0004020202020204" pitchFamily="34" charset="0"/>
-                <a:ea typeface="Times New Roman" panose="02020603050405020304" pitchFamily="18" charset="0"/>
-                <a:cs typeface="Times New Roman" panose="02020603050405020304" pitchFamily="18" charset="0"/>
-              </a:rPr>
-              <a:t>handy</a:t>
-            </a:r>
-          </a:p>
-          <a:p>
-            <a:r>
-              <a:rPr lang="en-CN" sz="3200" b="1" kern="0" spc="10" dirty="0">
-                <a:latin typeface="Aptos" panose="020B0004020202020204" pitchFamily="34" charset="0"/>
-                <a:ea typeface="Times New Roman" panose="02020603050405020304" pitchFamily="18" charset="0"/>
-                <a:cs typeface="Times New Roman" panose="02020603050405020304" pitchFamily="18" charset="0"/>
-              </a:rPr>
-              <a:t>anonymous</a:t>
-            </a:r>
-          </a:p>
-          <a:p>
-            <a:r>
-              <a:rPr lang="en-CN" sz="3200" b="1" kern="0" spc="10" dirty="0">
-                <a:latin typeface="Aptos" panose="020B0004020202020204" pitchFamily="34" charset="0"/>
-                <a:ea typeface="Times New Roman" panose="02020603050405020304" pitchFamily="18" charset="0"/>
-                <a:cs typeface="Times New Roman" panose="02020603050405020304" pitchFamily="18" charset="0"/>
-              </a:rPr>
-              <a:t>needed for a short period</a:t>
-            </a:r>
-            <a:r>
-              <a:rPr lang="en-CN" sz="2000" b="1" dirty="0">
-                <a:latin typeface="Aptos" panose="020B0004020202020204" pitchFamily="34" charset="0"/>
-              </a:rPr>
-              <a:t> </a:t>
-            </a:r>
-          </a:p>
-          <a:p>
-            <a:pPr marL="0" indent="0">
-              <a:buFont typeface="Arial" panose="020B0604020202020204" pitchFamily="34" charset="0"/>
-              <a:buNone/>
-            </a:pPr>
-            <a:endParaRPr lang="en-CN" sz="2000" b="1" dirty="0">
-              <a:latin typeface="Aptos" panose="020B0004020202020204" pitchFamily="34" charset="0"/>
-            </a:endParaRPr>
-          </a:p>
-        </p:txBody>
-      </p:sp>
-    </p:spTree>
-    <p:extLst>
-      <p:ext uri="{BB962C8B-B14F-4D97-AF65-F5344CB8AC3E}">
-        <p14:creationId xmlns:p14="http://schemas.microsoft.com/office/powerpoint/2010/main" val="2727222122"/>
-      </p:ext>
-    </p:extLst>
-  </p:cSld>
-  <p:clrMapOvr>
-    <a:masterClrMapping/>
-  </p:clrMapOvr>
-</p:sld>
-</file>
-
-<file path=ppt/slides/slide11.xml><?xml version="1.0" encoding="utf-8"?>
-<p:sld xmlns:a="http://schemas.openxmlformats.org/drawingml/2006/main" xmlns:r="http://schemas.openxmlformats.org/officeDocument/2006/relationships" xmlns:p="http://schemas.openxmlformats.org/presentationml/2006/main">
-  <p:cSld>
-    <p:spTree>
-      <p:nvGrpSpPr>
-        <p:cNvPr id="1" name="">
-          <a:extLst>
-            <a:ext uri="{FF2B5EF4-FFF2-40B4-BE49-F238E27FC236}">
-              <a16:creationId xmlns:a16="http://schemas.microsoft.com/office/drawing/2014/main" id="{C01CCDE9-09D7-A967-C1D2-4C75F0E9DDE6}"/>
-            </a:ext>
-          </a:extLst>
-        </p:cNvPr>
-        <p:cNvGrpSpPr/>
-        <p:nvPr/>
-      </p:nvGrpSpPr>
-      <p:grpSpPr>
-        <a:xfrm>
-          <a:off x="0" y="0"/>
-          <a:ext cx="0" cy="0"/>
-          <a:chOff x="0" y="0"/>
-          <a:chExt cx="0" cy="0"/>
-        </a:xfrm>
-      </p:grpSpPr>
-      <p:sp>
-        <p:nvSpPr>
-          <p:cNvPr id="2" name="Title 1">
-            <a:extLst>
-              <a:ext uri="{FF2B5EF4-FFF2-40B4-BE49-F238E27FC236}">
-                <a16:creationId xmlns:a16="http://schemas.microsoft.com/office/drawing/2014/main" id="{E66CB0C1-F60F-0374-184C-5E6BEC91E1DB}"/>
-              </a:ext>
-            </a:extLst>
-          </p:cNvPr>
-          <p:cNvSpPr>
-            <a:spLocks noGrp="1"/>
-          </p:cNvSpPr>
-          <p:nvPr>
-            <p:ph type="title"/>
-          </p:nvPr>
-        </p:nvSpPr>
-        <p:spPr/>
-        <p:txBody>
-          <a:bodyPr/>
-          <a:lstStyle/>
-          <a:p>
-            <a:r>
-              <a:rPr lang="en-US" altLang="zh-CN" dirty="0"/>
-              <a:t>The </a:t>
-            </a:r>
-            <a:r>
-              <a:rPr lang="en-US" altLang="zh-CN" dirty="0">
-                <a:solidFill>
-                  <a:srgbClr val="0070C0"/>
-                </a:solidFill>
-              </a:rPr>
-              <a:t>downside</a:t>
-            </a:r>
-            <a:r>
-              <a:rPr lang="en-US" altLang="zh-CN" dirty="0"/>
-              <a:t> of using Lambda function</a:t>
-            </a:r>
-            <a:endParaRPr lang="en-CN" dirty="0"/>
-          </a:p>
-        </p:txBody>
-      </p:sp>
-      <p:sp>
-        <p:nvSpPr>
-          <p:cNvPr id="5" name="内容占位符 4">
-            <a:extLst>
-              <a:ext uri="{FF2B5EF4-FFF2-40B4-BE49-F238E27FC236}">
-                <a16:creationId xmlns:a16="http://schemas.microsoft.com/office/drawing/2014/main" id="{8DAA8366-DCDB-8115-8B76-B4B0B7CBC2DA}"/>
-              </a:ext>
-            </a:extLst>
-          </p:cNvPr>
-          <p:cNvSpPr>
-            <a:spLocks noGrp="1"/>
-          </p:cNvSpPr>
-          <p:nvPr>
-            <p:ph idx="1"/>
-          </p:nvPr>
-        </p:nvSpPr>
-        <p:spPr/>
-        <p:txBody>
-          <a:bodyPr/>
-          <a:lstStyle/>
-          <a:p>
-            <a:r>
-              <a:rPr lang="en-CA" altLang="zh-CN" dirty="0"/>
-              <a:t>Limited Readability</a:t>
-            </a:r>
-          </a:p>
-          <a:p>
-            <a:r>
-              <a:rPr lang="en-CA" altLang="zh-CN" dirty="0"/>
-              <a:t>Can’t Handle Complex Logic</a:t>
-            </a:r>
-          </a:p>
-          <a:p>
-            <a:r>
-              <a:rPr lang="en-CA" altLang="zh-CN" dirty="0"/>
-              <a:t>Difficult to Debug</a:t>
-            </a:r>
-          </a:p>
-          <a:p>
-            <a:r>
-              <a:rPr lang="en-CA" altLang="zh-CN" dirty="0"/>
-              <a:t>Reusability Issues</a:t>
-            </a:r>
-            <a:endParaRPr lang="zh-CN" altLang="en-US" dirty="0"/>
-          </a:p>
-        </p:txBody>
-      </p:sp>
-    </p:spTree>
-    <p:extLst>
-      <p:ext uri="{BB962C8B-B14F-4D97-AF65-F5344CB8AC3E}">
-        <p14:creationId xmlns:p14="http://schemas.microsoft.com/office/powerpoint/2010/main" val="3257685436"/>
-      </p:ext>
-    </p:extLst>
-  </p:cSld>
-  <p:clrMapOvr>
-    <a:masterClrMapping/>
-  </p:clrMapOvr>
-</p:sld>
-</file>
-
-<file path=ppt/slides/slide12.xml><?xml version="1.0" encoding="utf-8"?>
-<p:sld xmlns:a="http://schemas.openxmlformats.org/drawingml/2006/main" xmlns:r="http://schemas.openxmlformats.org/officeDocument/2006/relationships" xmlns:p="http://schemas.openxmlformats.org/presentationml/2006/main">
-  <p:cSld>
-    <p:spTree>
-      <p:nvGrpSpPr>
-        <p:cNvPr id="1" name=""/>
-        <p:cNvGrpSpPr/>
-        <p:nvPr/>
-      </p:nvGrpSpPr>
-      <p:grpSpPr>
-        <a:xfrm>
-          <a:off x="0" y="0"/>
-          <a:ext cx="0" cy="0"/>
-          <a:chOff x="0" y="0"/>
-          <a:chExt cx="0" cy="0"/>
-        </a:xfrm>
-      </p:grpSpPr>
-      <p:sp>
-        <p:nvSpPr>
-          <p:cNvPr id="2" name="Title 1">
-            <a:extLst>
-              <a:ext uri="{FF2B5EF4-FFF2-40B4-BE49-F238E27FC236}">
-                <a16:creationId xmlns:a16="http://schemas.microsoft.com/office/drawing/2014/main" id="{518B82CE-FC9F-6602-8D28-F392FA7EDD6D}"/>
-              </a:ext>
-            </a:extLst>
-          </p:cNvPr>
-          <p:cNvSpPr>
-            <a:spLocks noGrp="1"/>
-          </p:cNvSpPr>
-          <p:nvPr>
-            <p:ph type="title"/>
-          </p:nvPr>
-        </p:nvSpPr>
-        <p:spPr/>
-        <p:txBody>
-          <a:bodyPr/>
-          <a:lstStyle/>
-          <a:p>
-            <a:r>
-              <a:rPr lang="en-US" dirty="0"/>
-              <a:t>Example of limited readability</a:t>
-            </a:r>
-            <a:endParaRPr lang="en-CN" dirty="0"/>
-          </a:p>
-        </p:txBody>
-      </p:sp>
-      <p:pic>
-        <p:nvPicPr>
-          <p:cNvPr id="9" name="图片 8">
-            <a:extLst>
-              <a:ext uri="{FF2B5EF4-FFF2-40B4-BE49-F238E27FC236}">
-                <a16:creationId xmlns:a16="http://schemas.microsoft.com/office/drawing/2014/main" id="{70FE5530-40FC-18A4-E6E6-23BE3CFDBDA2}"/>
-              </a:ext>
-            </a:extLst>
-          </p:cNvPr>
-          <p:cNvPicPr>
-            <a:picLocks noChangeAspect="1"/>
-          </p:cNvPicPr>
-          <p:nvPr/>
-        </p:nvPicPr>
-        <p:blipFill>
-          <a:blip r:embed="rId2"/>
-          <a:stretch>
-            <a:fillRect/>
-          </a:stretch>
-        </p:blipFill>
-        <p:spPr>
-          <a:xfrm>
-            <a:off x="838200" y="1690688"/>
-            <a:ext cx="10084278" cy="3283592"/>
-          </a:xfrm>
-          <a:prstGeom prst="rect">
-            <a:avLst/>
-          </a:prstGeom>
-        </p:spPr>
-      </p:pic>
-    </p:spTree>
-    <p:extLst>
-      <p:ext uri="{BB962C8B-B14F-4D97-AF65-F5344CB8AC3E}">
-        <p14:creationId xmlns:p14="http://schemas.microsoft.com/office/powerpoint/2010/main" val="3015026993"/>
       </p:ext>
     </p:extLst>
   </p:cSld>
@@ -4682,20 +4123,7 @@
                 </a:highlight>
                 <a:latin typeface="Arial" panose="020B0604020202020204" pitchFamily="34" charset="0"/>
               </a:rPr>
-              <a:t>PART II</a:t>
-            </a:r>
-            <a:r>
-              <a:rPr lang="en-US" altLang="zh-CN" sz="2800" b="0" i="0" dirty="0">
-                <a:solidFill>
-                  <a:srgbClr val="FFC000"/>
-                </a:solidFill>
-                <a:effectLst/>
-                <a:highlight>
-                  <a:srgbClr val="FFFFFF"/>
-                </a:highlight>
-                <a:latin typeface="Arial" panose="020B0604020202020204" pitchFamily="34" charset="0"/>
-              </a:rPr>
-              <a:t> </a:t>
+              <a:t>PART I</a:t>
             </a:r>
             <a:endParaRPr lang="en-US" altLang="zh-CN" sz="1600" b="0" i="0" dirty="0">
               <a:solidFill>
@@ -8712,7 +8140,7 @@
                 </a:highlight>
                 <a:latin typeface="Arial" panose="020B0604020202020204" pitchFamily="34" charset="0"/>
               </a:rPr>
-              <a:t>PART III</a:t>
+              <a:t>PART II</a:t>
             </a:r>
             <a:r>
               <a:rPr lang="en-US" altLang="zh-CN" sz="2800" b="0" i="0" dirty="0">
@@ -8761,7 +8189,7 @@
         <p:cNvPr id="1" name="">
           <a:extLst>
             <a:ext uri="{FF2B5EF4-FFF2-40B4-BE49-F238E27FC236}">
-              <a16:creationId xmlns:a16="http://schemas.microsoft.com/office/drawing/2014/main" id="{FFA98F55-6CEA-9F02-03CE-7B18938405D3}"/>
+              <a16:creationId xmlns:a16="http://schemas.microsoft.com/office/drawing/2014/main" id="{7A6767A6-9DBF-EEB3-E9F3-C4AEC7C84157}"/>
             </a:ext>
           </a:extLst>
         </p:cNvPr>
@@ -8781,7 +8209,7 @@
           <p:cNvPr id="2" name="Title 1">
             <a:extLst>
               <a:ext uri="{FF2B5EF4-FFF2-40B4-BE49-F238E27FC236}">
-                <a16:creationId xmlns:a16="http://schemas.microsoft.com/office/drawing/2014/main" id="{B1027CB2-C267-C0DC-2CC9-0DE916C7FBA3}"/>
+                <a16:creationId xmlns:a16="http://schemas.microsoft.com/office/drawing/2014/main" id="{709744B0-FF7F-B5CB-18B8-F189A88816E1}"/>
               </a:ext>
             </a:extLst>
           </p:cNvPr>
@@ -8789,13 +8217,13 @@
             <a:spLocks noGrp="1"/>
           </p:cNvSpPr>
           <p:nvPr>
-            <p:ph type="title"/>
+            <p:ph type="ctrTitle"/>
           </p:nvPr>
         </p:nvSpPr>
         <p:spPr>
           <a:xfrm>
-            <a:off x="753359" y="3020742"/>
-            <a:ext cx="10515600" cy="1325563"/>
+            <a:off x="1096652" y="1122363"/>
+            <a:ext cx="9998697" cy="2387600"/>
           </a:xfrm>
         </p:spPr>
         <p:txBody>
@@ -8803,30 +8231,14 @@
           <a:lstStyle/>
           <a:p>
             <a:r>
-              <a:rPr lang="en-US" altLang="zh-CN" dirty="0">
+              <a:rPr lang="en-CA" dirty="0">
                 <a:solidFill>
                   <a:srgbClr val="0070C0"/>
                 </a:solidFill>
                 <a:latin typeface="Arial" panose="020B0604020202020204" pitchFamily="34" charset="0"/>
                 <a:cs typeface="Arial" panose="020B0604020202020204" pitchFamily="34" charset="0"/>
               </a:rPr>
-              <a:t>Be careful!</a:t>
-            </a:r>
-            <a:br>
-              <a:rPr lang="en-US" altLang="zh-CN" dirty="0">
-                <a:solidFill>
-                  <a:srgbClr val="0070C0"/>
-                </a:solidFill>
-                <a:latin typeface="Arial" panose="020B0604020202020204" pitchFamily="34" charset="0"/>
-                <a:cs typeface="Arial" panose="020B0604020202020204" pitchFamily="34" charset="0"/>
-              </a:rPr>
-            </a:br>
-            <a:r>
-              <a:rPr lang="en-US" altLang="zh-CN" dirty="0">
-                <a:latin typeface="Arial" panose="020B0604020202020204" pitchFamily="34" charset="0"/>
-                <a:cs typeface="Arial" panose="020B0604020202020204" pitchFamily="34" charset="0"/>
-              </a:rPr>
-              <a:t>When to use and when not to use</a:t>
+              <a:t>Thank you!</a:t>
             </a:r>
             <a:endParaRPr lang="en-CN" dirty="0">
               <a:latin typeface="Arial" panose="020B0604020202020204" pitchFamily="34" charset="0"/>
@@ -8835,96 +8247,10 @@
           </a:p>
         </p:txBody>
       </p:sp>
-      <p:sp>
-        <p:nvSpPr>
-          <p:cNvPr id="7" name="Title 1">
-            <a:extLst>
-              <a:ext uri="{FF2B5EF4-FFF2-40B4-BE49-F238E27FC236}">
-                <a16:creationId xmlns:a16="http://schemas.microsoft.com/office/drawing/2014/main" id="{9A913F4F-6A1D-ADC0-7BFB-E710EAA63D12}"/>
-              </a:ext>
-            </a:extLst>
-          </p:cNvPr>
-          <p:cNvSpPr txBox="1">
-            <a:spLocks/>
-          </p:cNvSpPr>
-          <p:nvPr/>
-        </p:nvSpPr>
-        <p:spPr>
-          <a:xfrm>
-            <a:off x="753359" y="2032499"/>
-            <a:ext cx="10515600" cy="1325563"/>
-          </a:xfrm>
-          <a:prstGeom prst="rect">
-            <a:avLst/>
-          </a:prstGeom>
-        </p:spPr>
-        <p:txBody>
-          <a:bodyPr vert="horz" lIns="91440" tIns="45720" rIns="91440" bIns="45720" rtlCol="0" anchor="ctr">
-            <a:normAutofit/>
-          </a:bodyPr>
-          <a:lstStyle>
-            <a:lvl1pPr algn="l" defTabSz="914400" rtl="0" eaLnBrk="1" latinLnBrk="0" hangingPunct="1">
-              <a:lnSpc>
-                <a:spcPct val="90000"/>
-              </a:lnSpc>
-              <a:spcBef>
-                <a:spcPct val="0"/>
-              </a:spcBef>
-              <a:buNone/>
-              <a:defRPr sz="4400" kern="1200">
-                <a:solidFill>
-                  <a:schemeClr val="tx1"/>
-                </a:solidFill>
-                <a:latin typeface="+mj-lt"/>
-                <a:ea typeface="+mj-ea"/>
-                <a:cs typeface="+mj-cs"/>
-              </a:defRPr>
-            </a:lvl1pPr>
-          </a:lstStyle>
-          <a:p>
-            <a:r>
-              <a:rPr lang="en-US" altLang="zh-CN" sz="2800" b="1" i="0" dirty="0">
-                <a:solidFill>
-                  <a:srgbClr val="FFC000"/>
-                </a:solidFill>
-                <a:effectLst/>
-                <a:highlight>
-                  <a:srgbClr val="FFFFFF"/>
-                </a:highlight>
-                <a:latin typeface="Arial" panose="020B0604020202020204" pitchFamily="34" charset="0"/>
-              </a:rPr>
-              <a:t>PART VI</a:t>
-            </a:r>
-            <a:r>
-              <a:rPr lang="en-US" altLang="zh-CN" sz="2800" b="0" i="0" dirty="0">
-                <a:solidFill>
-                  <a:srgbClr val="FFC000"/>
-                </a:solidFill>
-                <a:effectLst/>
-                <a:highlight>
-                  <a:srgbClr val="FFFFFF"/>
-                </a:highlight>
-                <a:latin typeface="Arial" panose="020B0604020202020204" pitchFamily="34" charset="0"/>
-              </a:rPr>
-              <a:t> </a:t>
-            </a:r>
-            <a:endParaRPr lang="en-US" altLang="zh-CN" sz="1600" b="0" i="0" dirty="0">
-              <a:solidFill>
-                <a:srgbClr val="202122"/>
-              </a:solidFill>
-              <a:effectLst/>
-              <a:highlight>
-                <a:srgbClr val="FFFFFF"/>
-              </a:highlight>
-              <a:latin typeface="Arial" panose="020B0604020202020204" pitchFamily="34" charset="0"/>
-            </a:endParaRPr>
-          </a:p>
-        </p:txBody>
-      </p:sp>
     </p:spTree>
     <p:extLst>
       <p:ext uri="{BB962C8B-B14F-4D97-AF65-F5344CB8AC3E}">
-        <p14:creationId xmlns:p14="http://schemas.microsoft.com/office/powerpoint/2010/main" val="3719223142"/>
+        <p14:creationId xmlns:p14="http://schemas.microsoft.com/office/powerpoint/2010/main" val="766035853"/>
       </p:ext>
     </p:extLst>
   </p:cSld>

</xml_diff>

<commit_message>
update handouts with citation
</commit_message>
<xml_diff>
--- a/Presentation Lambda Function 4.pptx
+++ b/Presentation Lambda Function 4.pptx
@@ -5,7 +5,7 @@
     <p:sldMasterId id="2147483648" r:id="rId1"/>
   </p:sldMasterIdLst>
   <p:notesMasterIdLst>
-    <p:notesMasterId r:id="rId11"/>
+    <p:notesMasterId r:id="rId12"/>
   </p:notesMasterIdLst>
   <p:sldIdLst>
     <p:sldId id="256" r:id="rId2"/>
@@ -17,6 +17,7 @@
     <p:sldId id="276" r:id="rId8"/>
     <p:sldId id="287" r:id="rId9"/>
     <p:sldId id="289" r:id="rId10"/>
+    <p:sldId id="290" r:id="rId11"/>
   </p:sldIdLst>
   <p:sldSz cx="12192000" cy="6858000"/>
   <p:notesSz cx="6858000" cy="9144000"/>
@@ -3980,6 +3981,255 @@
     <p:extLst>
       <p:ext uri="{BB962C8B-B14F-4D97-AF65-F5344CB8AC3E}">
         <p14:creationId xmlns:p14="http://schemas.microsoft.com/office/powerpoint/2010/main" val="1761610305"/>
+      </p:ext>
+    </p:extLst>
+  </p:cSld>
+  <p:clrMapOvr>
+    <a:masterClrMapping/>
+  </p:clrMapOvr>
+</p:sld>
+</file>
+
+<file path=ppt/slides/slide10.xml><?xml version="1.0" encoding="utf-8"?>
+<p:sld xmlns:a="http://schemas.openxmlformats.org/drawingml/2006/main" xmlns:r="http://schemas.openxmlformats.org/officeDocument/2006/relationships" xmlns:p="http://schemas.openxmlformats.org/presentationml/2006/main">
+  <p:cSld>
+    <p:spTree>
+      <p:nvGrpSpPr>
+        <p:cNvPr id="1" name=""/>
+        <p:cNvGrpSpPr/>
+        <p:nvPr/>
+      </p:nvGrpSpPr>
+      <p:grpSpPr>
+        <a:xfrm>
+          <a:off x="0" y="0"/>
+          <a:ext cx="0" cy="0"/>
+          <a:chOff x="0" y="0"/>
+          <a:chExt cx="0" cy="0"/>
+        </a:xfrm>
+      </p:grpSpPr>
+      <p:sp>
+        <p:nvSpPr>
+          <p:cNvPr id="6" name="Title 1">
+            <a:extLst>
+              <a:ext uri="{FF2B5EF4-FFF2-40B4-BE49-F238E27FC236}">
+                <a16:creationId xmlns:a16="http://schemas.microsoft.com/office/drawing/2014/main" id="{FC53B97B-0AF4-3AB8-9CCE-B3E39128EEA6}"/>
+              </a:ext>
+            </a:extLst>
+          </p:cNvPr>
+          <p:cNvSpPr>
+            <a:spLocks noGrp="1"/>
+          </p:cNvSpPr>
+          <p:nvPr>
+            <p:ph type="title"/>
+          </p:nvPr>
+        </p:nvSpPr>
+        <p:spPr>
+          <a:xfrm>
+            <a:off x="838200" y="365125"/>
+            <a:ext cx="10515600" cy="1325563"/>
+          </a:xfrm>
+        </p:spPr>
+        <p:txBody>
+          <a:bodyPr>
+            <a:normAutofit/>
+          </a:bodyPr>
+          <a:lstStyle/>
+          <a:p>
+            <a:r>
+              <a:rPr lang="en-US" altLang="zh-CN" sz="4000" dirty="0"/>
+              <a:t>Citation</a:t>
+            </a:r>
+            <a:endParaRPr lang="en-CN" sz="4000" dirty="0"/>
+          </a:p>
+        </p:txBody>
+      </p:sp>
+      <p:sp>
+        <p:nvSpPr>
+          <p:cNvPr id="7" name="Content Placeholder 2">
+            <a:extLst>
+              <a:ext uri="{FF2B5EF4-FFF2-40B4-BE49-F238E27FC236}">
+                <a16:creationId xmlns:a16="http://schemas.microsoft.com/office/drawing/2014/main" id="{53911FAE-2CE5-5C05-0F07-BCA9705721BC}"/>
+              </a:ext>
+            </a:extLst>
+          </p:cNvPr>
+          <p:cNvSpPr>
+            <a:spLocks noGrp="1"/>
+          </p:cNvSpPr>
+          <p:nvPr>
+            <p:ph idx="1"/>
+          </p:nvPr>
+        </p:nvSpPr>
+        <p:spPr>
+          <a:xfrm>
+            <a:off x="838199" y="1408936"/>
+            <a:ext cx="10964159" cy="4351338"/>
+          </a:xfrm>
+        </p:spPr>
+        <p:txBody>
+          <a:bodyPr>
+            <a:normAutofit/>
+          </a:bodyPr>
+          <a:lstStyle/>
+          <a:p>
+            <a:pPr marL="0" indent="0" fontAlgn="base">
+              <a:buNone/>
+            </a:pPr>
+            <a:r>
+              <a:rPr lang="en-US" altLang="zh-CN" sz="1800" kern="100" dirty="0">
+                <a:latin typeface="DengXian" panose="02010600030101010101" pitchFamily="2" charset="-122"/>
+                <a:ea typeface="DengXian" panose="02010600030101010101" pitchFamily="2" charset="-122"/>
+                <a:cs typeface="Times New Roman" panose="02020603050405020304" pitchFamily="18" charset="0"/>
+              </a:rPr>
+              <a:t>1</a:t>
+            </a:r>
+            <a:r>
+              <a:rPr lang="en-US" altLang="zh-CN" sz="1800" kern="100" dirty="0">
+                <a:effectLst/>
+                <a:latin typeface="DengXian" panose="02010600030101010101" pitchFamily="2" charset="-122"/>
+                <a:ea typeface="DengXian" panose="02010600030101010101" pitchFamily="2" charset="-122"/>
+                <a:cs typeface="Times New Roman" panose="02020603050405020304" pitchFamily="18" charset="0"/>
+              </a:rPr>
+              <a:t>. Northeastern CS 5001, homework 5, gradeboo</a:t>
+            </a:r>
+            <a:r>
+              <a:rPr lang="en-US" altLang="zh-CN" sz="1800" kern="100" dirty="0">
+                <a:latin typeface="DengXian" panose="02010600030101010101" pitchFamily="2" charset="-122"/>
+                <a:ea typeface="DengXian" panose="02010600030101010101" pitchFamily="2" charset="-122"/>
+                <a:cs typeface="Times New Roman" panose="02020603050405020304" pitchFamily="18" charset="0"/>
+              </a:rPr>
+              <a:t>k, </a:t>
+            </a:r>
+            <a:r>
+              <a:rPr lang="en-US" altLang="zh-CN" sz="1800" kern="100" dirty="0">
+                <a:effectLst/>
+                <a:latin typeface="DengXian" panose="02010600030101010101" pitchFamily="2" charset="-122"/>
+                <a:ea typeface="DengXian" panose="02010600030101010101" pitchFamily="2" charset="-122"/>
+                <a:cs typeface="Times New Roman" panose="02020603050405020304" pitchFamily="18" charset="0"/>
+              </a:rPr>
+              <a:t> </a:t>
+            </a:r>
+            <a:r>
+              <a:rPr lang="en-US" altLang="zh-CN" sz="1800" kern="100" dirty="0">
+                <a:effectLst/>
+                <a:latin typeface="DengXian" panose="02010600030101010101" pitchFamily="2" charset="-122"/>
+                <a:ea typeface="DengXian" panose="02010600030101010101" pitchFamily="2" charset="-122"/>
+                <a:cs typeface="Times New Roman" panose="02020603050405020304" pitchFamily="18" charset="0"/>
+                <a:hlinkClick r:id="rId2"/>
+              </a:rPr>
+              <a:t>https://northeastern.instructure.com/courses/192162/assignments/2364714?module_item_id=10749754</a:t>
+            </a:r>
+            <a:r>
+              <a:rPr lang="en-US" altLang="zh-CN" sz="1800" kern="100" dirty="0">
+                <a:effectLst/>
+                <a:latin typeface="DengXian" panose="02010600030101010101" pitchFamily="2" charset="-122"/>
+                <a:ea typeface="DengXian" panose="02010600030101010101" pitchFamily="2" charset="-122"/>
+                <a:cs typeface="Times New Roman" panose="02020603050405020304" pitchFamily="18" charset="0"/>
+              </a:rPr>
+              <a:t> </a:t>
+            </a:r>
+          </a:p>
+          <a:p>
+            <a:pPr marL="0" indent="0" fontAlgn="base">
+              <a:buNone/>
+            </a:pPr>
+            <a:r>
+              <a:rPr lang="en-US" altLang="zh-CN" sz="1800" kern="100" dirty="0">
+                <a:latin typeface="DengXian" panose="02010600030101010101" pitchFamily="2" charset="-122"/>
+                <a:ea typeface="DengXian" panose="02010600030101010101" pitchFamily="2" charset="-122"/>
+                <a:cs typeface="Times New Roman" panose="02020603050405020304" pitchFamily="18" charset="0"/>
+              </a:rPr>
+              <a:t>2. </a:t>
+            </a:r>
+            <a:r>
+              <a:rPr lang="en-CA" altLang="zh-CN" sz="1800" kern="100" dirty="0">
+                <a:latin typeface="DengXian" panose="02010600030101010101" pitchFamily="2" charset="-122"/>
+                <a:ea typeface="DengXian" panose="02010600030101010101" pitchFamily="2" charset="-122"/>
+                <a:cs typeface="Times New Roman" panose="02020603050405020304" pitchFamily="18" charset="0"/>
+              </a:rPr>
+              <a:t>How to Use Python Lambda Functions, by Andre </a:t>
+            </a:r>
+            <a:r>
+              <a:rPr lang="en-CA" altLang="zh-CN" sz="1800" kern="100" dirty="0" err="1">
+                <a:latin typeface="DengXian" panose="02010600030101010101" pitchFamily="2" charset="-122"/>
+                <a:ea typeface="DengXian" panose="02010600030101010101" pitchFamily="2" charset="-122"/>
+                <a:cs typeface="Times New Roman" panose="02020603050405020304" pitchFamily="18" charset="0"/>
+              </a:rPr>
+              <a:t>Burgaud</a:t>
+            </a:r>
+            <a:r>
+              <a:rPr lang="en-CA" altLang="zh-CN" sz="1800" kern="100" dirty="0">
+                <a:latin typeface="DengXian" panose="02010600030101010101" pitchFamily="2" charset="-122"/>
+                <a:ea typeface="DengXian" panose="02010600030101010101" pitchFamily="2" charset="-122"/>
+                <a:cs typeface="Times New Roman" panose="02020603050405020304" pitchFamily="18" charset="0"/>
+              </a:rPr>
+              <a:t>, 19 Jun 2019, </a:t>
+            </a:r>
+            <a:r>
+              <a:rPr lang="en-CA" altLang="zh-CN" sz="1800" kern="100" dirty="0">
+                <a:latin typeface="DengXian" panose="02010600030101010101" pitchFamily="2" charset="-122"/>
+                <a:ea typeface="DengXian" panose="02010600030101010101" pitchFamily="2" charset="-122"/>
+                <a:cs typeface="Times New Roman" panose="02020603050405020304" pitchFamily="18" charset="0"/>
+                <a:hlinkClick r:id="rId3"/>
+              </a:rPr>
+              <a:t>https://realpython.com/python-lambda/</a:t>
+            </a:r>
+            <a:endParaRPr lang="en-CA" altLang="zh-CN" sz="1800" kern="100" dirty="0">
+              <a:latin typeface="DengXian" panose="02010600030101010101" pitchFamily="2" charset="-122"/>
+              <a:ea typeface="DengXian" panose="02010600030101010101" pitchFamily="2" charset="-122"/>
+              <a:cs typeface="Times New Roman" panose="02020603050405020304" pitchFamily="18" charset="0"/>
+            </a:endParaRPr>
+          </a:p>
+          <a:p>
+            <a:pPr marL="0" indent="0" fontAlgn="base">
+              <a:buNone/>
+            </a:pPr>
+            <a:r>
+              <a:rPr lang="en-CA" altLang="zh-CN" sz="1800" kern="100" dirty="0">
+                <a:latin typeface="DengXian" panose="02010600030101010101" pitchFamily="2" charset="-122"/>
+                <a:ea typeface="DengXian" panose="02010600030101010101" pitchFamily="2" charset="-122"/>
+                <a:cs typeface="Times New Roman" panose="02020603050405020304" pitchFamily="18" charset="0"/>
+              </a:rPr>
+              <a:t>3. Python Lambda Functions, Last Updated: 20 Jun 2024, </a:t>
+            </a:r>
+            <a:r>
+              <a:rPr lang="en-CA" altLang="zh-CN" sz="1800" kern="100" dirty="0">
+                <a:latin typeface="DengXian" panose="02010600030101010101" pitchFamily="2" charset="-122"/>
+                <a:ea typeface="DengXian" panose="02010600030101010101" pitchFamily="2" charset="-122"/>
+                <a:cs typeface="Times New Roman" panose="02020603050405020304" pitchFamily="18" charset="0"/>
+                <a:hlinkClick r:id="rId4"/>
+              </a:rPr>
+              <a:t>https://www.geeksforgeeks.org/python-lambda-anonymous-functions-filter-map-reduce</a:t>
+            </a:r>
+            <a:r>
+              <a:rPr lang="en-CA" altLang="zh-CN" sz="1800" kern="100">
+                <a:latin typeface="DengXian" panose="02010600030101010101" pitchFamily="2" charset="-122"/>
+                <a:ea typeface="DengXian" panose="02010600030101010101" pitchFamily="2" charset="-122"/>
+                <a:cs typeface="Times New Roman" panose="02020603050405020304" pitchFamily="18" charset="0"/>
+                <a:hlinkClick r:id="rId4"/>
+              </a:rPr>
+              <a:t>/</a:t>
+            </a:r>
+            <a:r>
+              <a:rPr lang="en-CA" altLang="zh-CN" sz="1800" kern="100">
+                <a:latin typeface="DengXian" panose="02010600030101010101" pitchFamily="2" charset="-122"/>
+                <a:ea typeface="DengXian" panose="02010600030101010101" pitchFamily="2" charset="-122"/>
+                <a:cs typeface="Times New Roman" panose="02020603050405020304" pitchFamily="18" charset="0"/>
+              </a:rPr>
+              <a:t> </a:t>
+            </a:r>
+            <a:endParaRPr lang="zh-CN" altLang="zh-CN" sz="1800" kern="100" dirty="0">
+              <a:effectLst/>
+              <a:latin typeface="DengXian" panose="02010600030101010101" pitchFamily="2" charset="-122"/>
+              <a:ea typeface="DengXian" panose="02010600030101010101" pitchFamily="2" charset="-122"/>
+              <a:cs typeface="Times New Roman" panose="02020603050405020304" pitchFamily="18" charset="0"/>
+            </a:endParaRPr>
+          </a:p>
+        </p:txBody>
+      </p:sp>
+    </p:spTree>
+    <p:extLst>
+      <p:ext uri="{BB962C8B-B14F-4D97-AF65-F5344CB8AC3E}">
+        <p14:creationId xmlns:p14="http://schemas.microsoft.com/office/powerpoint/2010/main" val="3232881712"/>
       </p:ext>
     </p:extLst>
   </p:cSld>

</xml_diff>